<commit_message>
erste fertige Version für Server teil der präsentation
</commit_message>
<xml_diff>
--- a/Praesentationen/02-Entwurfsphase/Entwurf Präsentation.pptx
+++ b/Praesentationen/02-Entwurfsphase/Entwurf Präsentation.pptx
@@ -139,7 +139,7 @@
 <file path=ppt/revisionInfo.xml><?xml version="1.0" encoding="utf-8"?>
 <p1510:revInfo xmlns:a="http://schemas.openxmlformats.org/drawingml/2006/main" xmlns:r="http://schemas.openxmlformats.org/officeDocument/2006/relationships" xmlns:p1510="http://schemas.microsoft.com/office/powerpoint/2015/10/main">
   <p1510:revLst>
-    <p1510:client id="{B121F1B0-4D08-E747-A677-49BC57413863}" v="28" dt="2022-01-09T09:22:01.694"/>
+    <p1510:client id="{B121F1B0-4D08-E747-A677-49BC57413863}" v="39" dt="2022-01-09T10:10:11.419"/>
   </p1510:revLst>
 </p1510:revInfo>
 </file>
@@ -568,71 +568,14 @@
           <a:p>
             <a:r>
               <a:rPr lang="de-DE" dirty="0"/>
-              <a:t>Aufgabe:</a:t>
+              <a:t>Alles getrennt was getrennt sein muss </a:t>
             </a:r>
           </a:p>
           <a:p>
             <a:r>
               <a:rPr lang="de-DE" dirty="0"/>
-              <a:t> - Dem Repository eine einfache Schnittstelle bereitstellen</a:t>
-            </a:r>
-          </a:p>
-          <a:p>
-            <a:r>
-              <a:rPr lang="de-DE" dirty="0"/>
-              <a:t>   -- Fassade in der RDS API einzige Schnittstelle für Methodenaufrufe</a:t>
-            </a:r>
-            <a:br>
-              <a:rPr lang="de-DE" dirty="0"/>
-            </a:br>
-            <a:r>
-              <a:rPr lang="de-DE" dirty="0"/>
-              <a:t> - Schnittstelle an externe Dienste</a:t>
-            </a:r>
-          </a:p>
-          <a:p>
-            <a:r>
-              <a:rPr lang="de-DE" dirty="0"/>
-              <a:t>   -- </a:t>
-            </a:r>
-            <a:r>
-              <a:rPr lang="de-DE" dirty="0" err="1"/>
-              <a:t>Firebase</a:t>
-            </a:r>
-            <a:endParaRPr lang="de-DE" dirty="0"/>
-          </a:p>
-          <a:p>
-            <a:r>
-              <a:rPr lang="de-DE" dirty="0"/>
-              <a:t>    --- um Nutzende anzumelden</a:t>
-            </a:r>
-          </a:p>
-          <a:p>
-            <a:r>
-              <a:rPr lang="de-DE" dirty="0"/>
-              <a:t>   -- Server</a:t>
-            </a:r>
-          </a:p>
-          <a:p>
-            <a:r>
-              <a:rPr lang="de-DE" dirty="0"/>
-              <a:t>    --- leitet Anfragen an den Server weiter</a:t>
-            </a:r>
-          </a:p>
-          <a:p>
-            <a:r>
-              <a:rPr lang="de-DE" dirty="0"/>
-              <a:t>    --- empfängt Antworten und leitet die weiter an das Repository</a:t>
-            </a:r>
-          </a:p>
-          <a:p>
-            <a:r>
-              <a:rPr lang="de-DE" dirty="0"/>
-              <a:t>     ---- Speichert außerdem einige Rückgabetypen in speziellen Queues -&gt; Besser für Repository</a:t>
-            </a:r>
-          </a:p>
-          <a:p>
-            <a:endParaRPr lang="de-DE" dirty="0"/>
+              <a:t>Kein doppelter Code </a:t>
+            </a:r>
           </a:p>
           <a:p>
             <a:endParaRPr lang="de-DE" dirty="0"/>
@@ -656,6 +599,159 @@
           <a:p>
             <a:fld id="{C2C6D2D8-86AA-475B-8106-1DD72F98FEFF}" type="slidenum">
               <a:rPr lang="de-DE" smtClean="0"/>
+              <a:t>3</a:t>
+            </a:fld>
+            <a:endParaRPr lang="de-DE"/>
+          </a:p>
+        </p:txBody>
+      </p:sp>
+    </p:spTree>
+    <p:extLst>
+      <p:ext uri="{BB962C8B-B14F-4D97-AF65-F5344CB8AC3E}">
+        <p14:creationId xmlns:p14="http://schemas.microsoft.com/office/powerpoint/2010/main" val="1791414030"/>
+      </p:ext>
+    </p:extLst>
+  </p:cSld>
+  <p:clrMapOvr>
+    <a:masterClrMapping/>
+  </p:clrMapOvr>
+</p:notes>
+</file>
+
+<file path=ppt/notesSlides/notesSlide2.xml><?xml version="1.0" encoding="utf-8"?>
+<p:notes xmlns:a="http://schemas.openxmlformats.org/drawingml/2006/main" xmlns:r="http://schemas.openxmlformats.org/officeDocument/2006/relationships" xmlns:p="http://schemas.openxmlformats.org/presentationml/2006/main">
+  <p:cSld>
+    <p:spTree>
+      <p:nvGrpSpPr>
+        <p:cNvPr id="1" name=""/>
+        <p:cNvGrpSpPr/>
+        <p:nvPr/>
+      </p:nvGrpSpPr>
+      <p:grpSpPr>
+        <a:xfrm>
+          <a:off x="0" y="0"/>
+          <a:ext cx="0" cy="0"/>
+          <a:chOff x="0" y="0"/>
+          <a:chExt cx="0" cy="0"/>
+        </a:xfrm>
+      </p:grpSpPr>
+      <p:sp>
+        <p:nvSpPr>
+          <p:cNvPr id="2" name="Folienbildplatzhalter 1"/>
+          <p:cNvSpPr>
+            <a:spLocks noGrp="1" noRot="1" noChangeAspect="1"/>
+          </p:cNvSpPr>
+          <p:nvPr>
+            <p:ph type="sldImg"/>
+          </p:nvPr>
+        </p:nvSpPr>
+        <p:spPr/>
+      </p:sp>
+      <p:sp>
+        <p:nvSpPr>
+          <p:cNvPr id="3" name="Notizenplatzhalter 2"/>
+          <p:cNvSpPr>
+            <a:spLocks noGrp="1"/>
+          </p:cNvSpPr>
+          <p:nvPr>
+            <p:ph type="body" idx="1"/>
+          </p:nvPr>
+        </p:nvSpPr>
+        <p:spPr/>
+        <p:txBody>
+          <a:bodyPr/>
+          <a:lstStyle/>
+          <a:p>
+            <a:r>
+              <a:rPr lang="de-DE" dirty="0"/>
+              <a:t>Aufgabe:</a:t>
+            </a:r>
+          </a:p>
+          <a:p>
+            <a:r>
+              <a:rPr lang="de-DE" dirty="0"/>
+              <a:t> - Dem Repository eine einfache Schnittstelle bereitstellen</a:t>
+            </a:r>
+          </a:p>
+          <a:p>
+            <a:r>
+              <a:rPr lang="de-DE" dirty="0"/>
+              <a:t>   -- Fassade in der RDS API einzige Schnittstelle für Methodenaufrufe</a:t>
+            </a:r>
+            <a:br>
+              <a:rPr lang="de-DE" dirty="0"/>
+            </a:br>
+            <a:r>
+              <a:rPr lang="de-DE" dirty="0"/>
+              <a:t> - Schnittstelle an externe Dienste</a:t>
+            </a:r>
+          </a:p>
+          <a:p>
+            <a:r>
+              <a:rPr lang="de-DE" dirty="0"/>
+              <a:t>   -- </a:t>
+            </a:r>
+            <a:r>
+              <a:rPr lang="de-DE" dirty="0" err="1"/>
+              <a:t>Firebase</a:t>
+            </a:r>
+            <a:endParaRPr lang="de-DE" dirty="0"/>
+          </a:p>
+          <a:p>
+            <a:r>
+              <a:rPr lang="de-DE" dirty="0"/>
+              <a:t>    --- um Nutzende anzumelden</a:t>
+            </a:r>
+          </a:p>
+          <a:p>
+            <a:r>
+              <a:rPr lang="de-DE" dirty="0"/>
+              <a:t>   -- Server</a:t>
+            </a:r>
+          </a:p>
+          <a:p>
+            <a:r>
+              <a:rPr lang="de-DE" dirty="0"/>
+              <a:t>    --- leitet Anfragen an den Server weiter</a:t>
+            </a:r>
+          </a:p>
+          <a:p>
+            <a:r>
+              <a:rPr lang="de-DE" dirty="0"/>
+              <a:t>    --- empfängt Antworten und leitet die weiter an das Repository</a:t>
+            </a:r>
+          </a:p>
+          <a:p>
+            <a:r>
+              <a:rPr lang="de-DE" dirty="0"/>
+              <a:t>     ---- Speichert außerdem einige Rückgabetypen in speziellen Queues -&gt; Besser für Repository</a:t>
+            </a:r>
+          </a:p>
+          <a:p>
+            <a:endParaRPr lang="de-DE" dirty="0"/>
+          </a:p>
+          <a:p>
+            <a:endParaRPr lang="de-DE" dirty="0"/>
+          </a:p>
+        </p:txBody>
+      </p:sp>
+      <p:sp>
+        <p:nvSpPr>
+          <p:cNvPr id="4" name="Foliennummernplatzhalter 3"/>
+          <p:cNvSpPr>
+            <a:spLocks noGrp="1"/>
+          </p:cNvSpPr>
+          <p:nvPr>
+            <p:ph type="sldNum" sz="quarter" idx="5"/>
+          </p:nvPr>
+        </p:nvSpPr>
+        <p:spPr/>
+        <p:txBody>
+          <a:bodyPr/>
+          <a:lstStyle/>
+          <a:p>
+            <a:fld id="{C2C6D2D8-86AA-475B-8106-1DD72F98FEFF}" type="slidenum">
+              <a:rPr lang="de-DE" smtClean="0"/>
               <a:t>8</a:t>
             </a:fld>
             <a:endParaRPr lang="de-DE"/>
@@ -666,6 +762,609 @@
     <p:extLst>
       <p:ext uri="{BB962C8B-B14F-4D97-AF65-F5344CB8AC3E}">
         <p14:creationId xmlns:p14="http://schemas.microsoft.com/office/powerpoint/2010/main" val="690369194"/>
+      </p:ext>
+    </p:extLst>
+  </p:cSld>
+  <p:clrMapOvr>
+    <a:masterClrMapping/>
+  </p:clrMapOvr>
+</p:notes>
+</file>
+
+<file path=ppt/notesSlides/notesSlide3.xml><?xml version="1.0" encoding="utf-8"?>
+<p:notes xmlns:a="http://schemas.openxmlformats.org/drawingml/2006/main" xmlns:r="http://schemas.openxmlformats.org/officeDocument/2006/relationships" xmlns:p="http://schemas.openxmlformats.org/presentationml/2006/main">
+  <p:cSld>
+    <p:spTree>
+      <p:nvGrpSpPr>
+        <p:cNvPr id="1" name=""/>
+        <p:cNvGrpSpPr/>
+        <p:nvPr/>
+      </p:nvGrpSpPr>
+      <p:grpSpPr>
+        <a:xfrm>
+          <a:off x="0" y="0"/>
+          <a:ext cx="0" cy="0"/>
+          <a:chOff x="0" y="0"/>
+          <a:chExt cx="0" cy="0"/>
+        </a:xfrm>
+      </p:grpSpPr>
+      <p:sp>
+        <p:nvSpPr>
+          <p:cNvPr id="2" name="Folienbildplatzhalter 1"/>
+          <p:cNvSpPr>
+            <a:spLocks noGrp="1" noRot="1" noChangeAspect="1"/>
+          </p:cNvSpPr>
+          <p:nvPr>
+            <p:ph type="sldImg"/>
+          </p:nvPr>
+        </p:nvSpPr>
+        <p:spPr/>
+      </p:sp>
+      <p:sp>
+        <p:nvSpPr>
+          <p:cNvPr id="3" name="Notizenplatzhalter 2"/>
+          <p:cNvSpPr>
+            <a:spLocks noGrp="1"/>
+          </p:cNvSpPr>
+          <p:nvPr>
+            <p:ph type="body" idx="1"/>
+          </p:nvPr>
+        </p:nvSpPr>
+        <p:spPr/>
+        <p:txBody>
+          <a:bodyPr/>
+          <a:lstStyle/>
+          <a:p>
+            <a:r>
+              <a:rPr lang="de-DE" dirty="0"/>
+              <a:t>Logik nicht in die „Schnittstelle“ zum Client</a:t>
+            </a:r>
+          </a:p>
+          <a:p>
+            <a:endParaRPr lang="de-DE" dirty="0"/>
+          </a:p>
+          <a:p>
+            <a:endParaRPr lang="de-DE" dirty="0"/>
+          </a:p>
+          <a:p>
+            <a:r>
+              <a:rPr lang="de-DE" dirty="0" err="1"/>
+              <a:t>Abauf</a:t>
+            </a:r>
+            <a:r>
+              <a:rPr lang="de-DE" dirty="0"/>
+              <a:t>: </a:t>
+            </a:r>
+          </a:p>
+          <a:p>
+            <a:pPr marL="171450" indent="-171450">
+              <a:buFontTx/>
+              <a:buChar char="-"/>
+            </a:pPr>
+            <a:r>
+              <a:rPr lang="de-DE" dirty="0"/>
+              <a:t>Client ruft </a:t>
+            </a:r>
+            <a:r>
+              <a:rPr lang="de-DE" dirty="0" err="1"/>
+              <a:t>funktion</a:t>
+            </a:r>
+            <a:r>
+              <a:rPr lang="de-DE" dirty="0"/>
+              <a:t> in Controller auf durch URI</a:t>
+            </a:r>
+          </a:p>
+          <a:p>
+            <a:pPr marL="171450" indent="-171450">
+              <a:buFontTx/>
+              <a:buChar char="-"/>
+            </a:pPr>
+            <a:r>
+              <a:rPr lang="de-DE" dirty="0"/>
+              <a:t>Validierung haut </a:t>
+            </a:r>
+            <a:r>
+              <a:rPr lang="de-DE" dirty="0" err="1"/>
+              <a:t>dazuwischen</a:t>
+            </a:r>
+            <a:r>
+              <a:rPr lang="de-DE" dirty="0"/>
+              <a:t>  </a:t>
+            </a:r>
+            <a:r>
+              <a:rPr lang="de-DE" dirty="0">
+                <a:sym typeface="Wingdings" pitchFamily="2" charset="2"/>
+              </a:rPr>
+              <a:t> in </a:t>
+            </a:r>
+            <a:r>
+              <a:rPr lang="de-DE" dirty="0" err="1">
+                <a:sym typeface="Wingdings" pitchFamily="2" charset="2"/>
+              </a:rPr>
+              <a:t>onlineProjekt</a:t>
+            </a:r>
+            <a:r>
+              <a:rPr lang="de-DE" dirty="0">
+                <a:sym typeface="Wingdings" pitchFamily="2" charset="2"/>
+              </a:rPr>
+              <a:t> auch die zweite Validierung, falls benötigt </a:t>
+            </a:r>
+          </a:p>
+          <a:p>
+            <a:pPr marL="171450" indent="-171450">
+              <a:buFontTx/>
+              <a:buChar char="-"/>
+            </a:pPr>
+            <a:r>
+              <a:rPr lang="de-DE" dirty="0">
+                <a:sym typeface="Wingdings" pitchFamily="2" charset="2"/>
+              </a:rPr>
+              <a:t>In Controller aufgerufen </a:t>
+            </a:r>
+          </a:p>
+          <a:p>
+            <a:pPr marL="171450" indent="-171450">
+              <a:buFontTx/>
+              <a:buChar char="-"/>
+            </a:pPr>
+            <a:r>
+              <a:rPr lang="de-DE" dirty="0">
+                <a:sym typeface="Wingdings" pitchFamily="2" charset="2"/>
+              </a:rPr>
+              <a:t>Ruf dann die </a:t>
+            </a:r>
+            <a:r>
+              <a:rPr lang="de-DE" dirty="0" err="1">
+                <a:sym typeface="Wingdings" pitchFamily="2" charset="2"/>
+              </a:rPr>
+              <a:t>rischtigen</a:t>
+            </a:r>
+            <a:r>
+              <a:rPr lang="de-DE" dirty="0">
+                <a:sym typeface="Wingdings" pitchFamily="2" charset="2"/>
+              </a:rPr>
+              <a:t> </a:t>
+            </a:r>
+            <a:r>
+              <a:rPr lang="de-DE" dirty="0" err="1">
+                <a:sym typeface="Wingdings" pitchFamily="2" charset="2"/>
+              </a:rPr>
+              <a:t>Repos</a:t>
+            </a:r>
+            <a:r>
+              <a:rPr lang="de-DE" dirty="0">
+                <a:sym typeface="Wingdings" pitchFamily="2" charset="2"/>
+              </a:rPr>
+              <a:t> auf</a:t>
+            </a:r>
+          </a:p>
+          <a:p>
+            <a:pPr marL="171450" indent="-171450">
+              <a:buFontTx/>
+              <a:buChar char="-"/>
+            </a:pPr>
+            <a:r>
+              <a:rPr lang="de-DE" dirty="0" err="1">
+                <a:sym typeface="Wingdings" pitchFamily="2" charset="2"/>
+              </a:rPr>
+              <a:t>Repos</a:t>
+            </a:r>
+            <a:r>
+              <a:rPr lang="de-DE" dirty="0">
+                <a:sym typeface="Wingdings" pitchFamily="2" charset="2"/>
+              </a:rPr>
+              <a:t> greifen aus Model bzw. die Tabellen auf</a:t>
+            </a:r>
+          </a:p>
+          <a:p>
+            <a:pPr marL="171450" indent="-171450">
+              <a:buFontTx/>
+              <a:buChar char="-"/>
+            </a:pPr>
+            <a:r>
+              <a:rPr lang="de-DE" dirty="0" err="1">
+                <a:sym typeface="Wingdings" pitchFamily="2" charset="2"/>
+              </a:rPr>
+              <a:t>Repo</a:t>
+            </a:r>
+            <a:r>
+              <a:rPr lang="de-DE" dirty="0">
+                <a:sym typeface="Wingdings" pitchFamily="2" charset="2"/>
+              </a:rPr>
+              <a:t> geben </a:t>
+            </a:r>
+            <a:r>
+              <a:rPr lang="de-DE" dirty="0" err="1">
+                <a:sym typeface="Wingdings" pitchFamily="2" charset="2"/>
+              </a:rPr>
+              <a:t>zeugs</a:t>
+            </a:r>
+            <a:r>
+              <a:rPr lang="de-DE" dirty="0">
+                <a:sym typeface="Wingdings" pitchFamily="2" charset="2"/>
+              </a:rPr>
+              <a:t> passend zurück.</a:t>
+            </a:r>
+          </a:p>
+          <a:p>
+            <a:pPr marL="171450" indent="-171450">
+              <a:buFontTx/>
+              <a:buChar char="-"/>
+            </a:pPr>
+            <a:r>
+              <a:rPr lang="de-DE" dirty="0">
+                <a:sym typeface="Wingdings" pitchFamily="2" charset="2"/>
+              </a:rPr>
+              <a:t>Gibt anfrage an Controller zurück,</a:t>
+            </a:r>
+          </a:p>
+          <a:p>
+            <a:pPr marL="171450" indent="-171450">
+              <a:buFontTx/>
+              <a:buChar char="-"/>
+            </a:pPr>
+            <a:r>
+              <a:rPr lang="de-DE" dirty="0">
+                <a:sym typeface="Wingdings" pitchFamily="2" charset="2"/>
+              </a:rPr>
+              <a:t>Baut Response, gibt sie an den Client zurück</a:t>
+            </a:r>
+          </a:p>
+          <a:p>
+            <a:pPr marL="171450" indent="-171450">
+              <a:buFontTx/>
+              <a:buChar char="-"/>
+            </a:pPr>
+            <a:endParaRPr lang="de-DE" dirty="0">
+              <a:sym typeface="Wingdings" pitchFamily="2" charset="2"/>
+            </a:endParaRPr>
+          </a:p>
+          <a:p>
+            <a:pPr marL="171450" indent="-171450">
+              <a:buFontTx/>
+              <a:buChar char="-"/>
+            </a:pPr>
+            <a:r>
+              <a:rPr lang="de-DE" dirty="0">
+                <a:sym typeface="Wingdings" pitchFamily="2" charset="2"/>
+              </a:rPr>
+              <a:t>Neu:</a:t>
+            </a:r>
+          </a:p>
+          <a:p>
+            <a:pPr marL="171450" marR="0" lvl="0" indent="-171450" algn="l" defTabSz="914400" rtl="0" eaLnBrk="1" fontAlgn="auto" latinLnBrk="0" hangingPunct="1">
+              <a:lnSpc>
+                <a:spcPct val="100000"/>
+              </a:lnSpc>
+              <a:spcBef>
+                <a:spcPts val="0"/>
+              </a:spcBef>
+              <a:spcAft>
+                <a:spcPts val="0"/>
+              </a:spcAft>
+              <a:buClrTx/>
+              <a:buSzTx/>
+              <a:buFontTx/>
+              <a:buChar char="-"/>
+              <a:tabLst/>
+              <a:defRPr/>
+            </a:pPr>
+            <a:r>
+              <a:rPr lang="de-DE" dirty="0"/>
+              <a:t>Problem : </a:t>
+            </a:r>
+            <a:r>
+              <a:rPr lang="de-DE" dirty="0" err="1"/>
+              <a:t>Repositiory</a:t>
+            </a:r>
+            <a:r>
+              <a:rPr lang="de-DE" dirty="0"/>
+              <a:t> nur für eine Tabelle,, Controller nur ein </a:t>
+            </a:r>
+            <a:r>
+              <a:rPr lang="de-DE" dirty="0" err="1"/>
+              <a:t>Repo</a:t>
+            </a:r>
+            <a:endParaRPr lang="de-DE" dirty="0"/>
+          </a:p>
+          <a:p>
+            <a:pPr marL="171450" marR="0" lvl="0" indent="-171450" algn="l" defTabSz="914400" rtl="0" eaLnBrk="1" fontAlgn="auto" latinLnBrk="0" hangingPunct="1">
+              <a:lnSpc>
+                <a:spcPct val="100000"/>
+              </a:lnSpc>
+              <a:spcBef>
+                <a:spcPts val="0"/>
+              </a:spcBef>
+              <a:spcAft>
+                <a:spcPts val="0"/>
+              </a:spcAft>
+              <a:buClrTx/>
+              <a:buSzTx/>
+              <a:buFontTx/>
+              <a:buChar char="-"/>
+              <a:tabLst/>
+              <a:defRPr/>
+            </a:pPr>
+            <a:r>
+              <a:rPr lang="de-DE" dirty="0"/>
+              <a:t>Braucht </a:t>
+            </a:r>
+            <a:r>
+              <a:rPr lang="de-DE" dirty="0" err="1"/>
+              <a:t>infos</a:t>
+            </a:r>
+            <a:r>
+              <a:rPr lang="de-DE" dirty="0"/>
+              <a:t> aus verschiedenen </a:t>
+            </a:r>
+            <a:r>
+              <a:rPr lang="de-DE" dirty="0" err="1"/>
+              <a:t>Repos</a:t>
+            </a:r>
+            <a:r>
+              <a:rPr lang="de-DE" dirty="0"/>
+              <a:t> teils</a:t>
+            </a:r>
+          </a:p>
+          <a:p>
+            <a:pPr marL="171450" marR="0" lvl="0" indent="-171450" algn="l" defTabSz="914400" rtl="0" eaLnBrk="1" fontAlgn="auto" latinLnBrk="0" hangingPunct="1">
+              <a:lnSpc>
+                <a:spcPct val="100000"/>
+              </a:lnSpc>
+              <a:spcBef>
+                <a:spcPts val="0"/>
+              </a:spcBef>
+              <a:spcAft>
+                <a:spcPts val="0"/>
+              </a:spcAft>
+              <a:buClrTx/>
+              <a:buSzTx/>
+              <a:buFontTx/>
+              <a:buChar char="-"/>
+              <a:tabLst/>
+              <a:defRPr/>
+            </a:pPr>
+            <a:r>
+              <a:rPr lang="de-DE" dirty="0"/>
+              <a:t>Service ist </a:t>
+            </a:r>
+            <a:r>
+              <a:rPr lang="de-DE" dirty="0" err="1"/>
+              <a:t>logik</a:t>
+            </a:r>
+            <a:r>
+              <a:rPr lang="de-DE" dirty="0"/>
+              <a:t> dazwischen, kann mehrere </a:t>
+            </a:r>
+            <a:r>
+              <a:rPr lang="de-DE" dirty="0" err="1"/>
+              <a:t>repos</a:t>
+            </a:r>
+            <a:r>
+              <a:rPr lang="de-DE" dirty="0"/>
+              <a:t> verwalten</a:t>
+            </a:r>
+          </a:p>
+          <a:p>
+            <a:pPr marL="171450" indent="-171450">
+              <a:buFontTx/>
+              <a:buChar char="-"/>
+            </a:pPr>
+            <a:endParaRPr lang="de-DE" dirty="0">
+              <a:sym typeface="Wingdings" pitchFamily="2" charset="2"/>
+            </a:endParaRPr>
+          </a:p>
+        </p:txBody>
+      </p:sp>
+      <p:sp>
+        <p:nvSpPr>
+          <p:cNvPr id="4" name="Foliennummernplatzhalter 3"/>
+          <p:cNvSpPr>
+            <a:spLocks noGrp="1"/>
+          </p:cNvSpPr>
+          <p:nvPr>
+            <p:ph type="sldNum" sz="quarter" idx="5"/>
+          </p:nvPr>
+        </p:nvSpPr>
+        <p:spPr/>
+        <p:txBody>
+          <a:bodyPr/>
+          <a:lstStyle/>
+          <a:p>
+            <a:fld id="{C2C6D2D8-86AA-475B-8106-1DD72F98FEFF}" type="slidenum">
+              <a:rPr lang="de-DE" smtClean="0"/>
+              <a:t>9</a:t>
+            </a:fld>
+            <a:endParaRPr lang="de-DE"/>
+          </a:p>
+        </p:txBody>
+      </p:sp>
+    </p:spTree>
+    <p:extLst>
+      <p:ext uri="{BB962C8B-B14F-4D97-AF65-F5344CB8AC3E}">
+        <p14:creationId xmlns:p14="http://schemas.microsoft.com/office/powerpoint/2010/main" val="2880677660"/>
+      </p:ext>
+    </p:extLst>
+  </p:cSld>
+  <p:clrMapOvr>
+    <a:masterClrMapping/>
+  </p:clrMapOvr>
+</p:notes>
+</file>
+
+<file path=ppt/notesSlides/notesSlide4.xml><?xml version="1.0" encoding="utf-8"?>
+<p:notes xmlns:a="http://schemas.openxmlformats.org/drawingml/2006/main" xmlns:r="http://schemas.openxmlformats.org/officeDocument/2006/relationships" xmlns:p="http://schemas.openxmlformats.org/presentationml/2006/main">
+  <p:cSld>
+    <p:spTree>
+      <p:nvGrpSpPr>
+        <p:cNvPr id="1" name=""/>
+        <p:cNvGrpSpPr/>
+        <p:nvPr/>
+      </p:nvGrpSpPr>
+      <p:grpSpPr>
+        <a:xfrm>
+          <a:off x="0" y="0"/>
+          <a:ext cx="0" cy="0"/>
+          <a:chOff x="0" y="0"/>
+          <a:chExt cx="0" cy="0"/>
+        </a:xfrm>
+      </p:grpSpPr>
+      <p:sp>
+        <p:nvSpPr>
+          <p:cNvPr id="2" name="Folienbildplatzhalter 1"/>
+          <p:cNvSpPr>
+            <a:spLocks noGrp="1" noRot="1" noChangeAspect="1"/>
+          </p:cNvSpPr>
+          <p:nvPr>
+            <p:ph type="sldImg"/>
+          </p:nvPr>
+        </p:nvSpPr>
+        <p:spPr/>
+      </p:sp>
+      <p:sp>
+        <p:nvSpPr>
+          <p:cNvPr id="3" name="Notizenplatzhalter 2"/>
+          <p:cNvSpPr>
+            <a:spLocks noGrp="1"/>
+          </p:cNvSpPr>
+          <p:nvPr>
+            <p:ph type="body" idx="1"/>
+          </p:nvPr>
+        </p:nvSpPr>
+        <p:spPr/>
+        <p:txBody>
+          <a:bodyPr/>
+          <a:lstStyle/>
+          <a:p>
+            <a:r>
+              <a:rPr lang="de-DE" dirty="0"/>
+              <a:t>Benutzt </a:t>
+            </a:r>
+            <a:r>
+              <a:rPr lang="de-DE" dirty="0" err="1"/>
+              <a:t>springboot</a:t>
+            </a:r>
+            <a:endParaRPr lang="de-DE" dirty="0"/>
+          </a:p>
+          <a:p>
+            <a:pPr marL="171450" indent="-171450">
+              <a:buFontTx/>
+              <a:buChar char="-"/>
+            </a:pPr>
+            <a:r>
+              <a:rPr lang="de-DE" dirty="0"/>
+              <a:t>Stellt viele </a:t>
+            </a:r>
+            <a:r>
+              <a:rPr lang="de-DE" dirty="0" err="1"/>
+              <a:t>anntationen</a:t>
+            </a:r>
+            <a:r>
+              <a:rPr lang="de-DE" dirty="0"/>
+              <a:t> zur </a:t>
+            </a:r>
+            <a:r>
+              <a:rPr lang="de-DE" dirty="0" err="1"/>
+              <a:t>verfügung</a:t>
+            </a:r>
+            <a:endParaRPr lang="de-DE" dirty="0"/>
+          </a:p>
+          <a:p>
+            <a:pPr marL="171450" indent="-171450">
+              <a:buFontTx/>
+              <a:buChar char="-"/>
+            </a:pPr>
+            <a:r>
+              <a:rPr lang="de-DE" dirty="0"/>
+              <a:t>Spring ist mächtiger, muss mehr selber machen </a:t>
+            </a:r>
+            <a:r>
+              <a:rPr lang="de-DE" dirty="0">
+                <a:sym typeface="Wingdings" pitchFamily="2" charset="2"/>
+              </a:rPr>
+              <a:t> für uns nicht nötig</a:t>
+            </a:r>
+          </a:p>
+          <a:p>
+            <a:pPr marL="171450" indent="-171450">
+              <a:buFontTx/>
+              <a:buChar char="-"/>
+            </a:pPr>
+            <a:endParaRPr lang="de-DE" dirty="0">
+              <a:sym typeface="Wingdings" pitchFamily="2" charset="2"/>
+            </a:endParaRPr>
+          </a:p>
+          <a:p>
+            <a:pPr marL="171450" indent="-171450">
+              <a:buFontTx/>
+              <a:buChar char="-"/>
+            </a:pPr>
+            <a:r>
+              <a:rPr lang="de-DE" dirty="0">
+                <a:sym typeface="Wingdings" pitchFamily="2" charset="2"/>
+              </a:rPr>
+              <a:t>Interessant: </a:t>
+            </a:r>
+          </a:p>
+          <a:p>
+            <a:pPr marL="171450" indent="-171450">
+              <a:buFontTx/>
+              <a:buChar char="-"/>
+            </a:pPr>
+            <a:r>
+              <a:rPr lang="de-DE" dirty="0">
+                <a:sym typeface="Wingdings" pitchFamily="2" charset="2"/>
+              </a:rPr>
+              <a:t>Validierung per Interceptor</a:t>
+            </a:r>
+          </a:p>
+          <a:p>
+            <a:pPr marL="628650" lvl="1" indent="-171450">
+              <a:buFontTx/>
+              <a:buChar char="-"/>
+            </a:pPr>
+            <a:r>
+              <a:rPr lang="de-DE" dirty="0">
+                <a:sym typeface="Wingdings" pitchFamily="2" charset="2"/>
+              </a:rPr>
+              <a:t>Sicher, dass nicht um Validierung herumkommt, wenn </a:t>
+            </a:r>
+            <a:r>
+              <a:rPr lang="de-DE">
+                <a:sym typeface="Wingdings" pitchFamily="2" charset="2"/>
+              </a:rPr>
+              <a:t>nicht gewollt.</a:t>
+            </a:r>
+          </a:p>
+        </p:txBody>
+      </p:sp>
+      <p:sp>
+        <p:nvSpPr>
+          <p:cNvPr id="4" name="Foliennummernplatzhalter 3"/>
+          <p:cNvSpPr>
+            <a:spLocks noGrp="1"/>
+          </p:cNvSpPr>
+          <p:nvPr>
+            <p:ph type="sldNum" sz="quarter" idx="5"/>
+          </p:nvPr>
+        </p:nvSpPr>
+        <p:spPr/>
+        <p:txBody>
+          <a:bodyPr/>
+          <a:lstStyle/>
+          <a:p>
+            <a:fld id="{C2C6D2D8-86AA-475B-8106-1DD72F98FEFF}" type="slidenum">
+              <a:rPr lang="de-DE" smtClean="0"/>
+              <a:t>10</a:t>
+            </a:fld>
+            <a:endParaRPr lang="de-DE"/>
+          </a:p>
+        </p:txBody>
+      </p:sp>
+    </p:spTree>
+    <p:extLst>
+      <p:ext uri="{BB962C8B-B14F-4D97-AF65-F5344CB8AC3E}">
+        <p14:creationId xmlns:p14="http://schemas.microsoft.com/office/powerpoint/2010/main" val="1606875005"/>
       </p:ext>
     </p:extLst>
   </p:cSld>
@@ -10474,6 +11173,116 @@
           </a:p>
         </p:txBody>
       </p:sp>
+      <p:sp>
+        <p:nvSpPr>
+          <p:cNvPr id="17" name="Inhaltsplatzhalter 2">
+            <a:extLst>
+              <a:ext uri="{FF2B5EF4-FFF2-40B4-BE49-F238E27FC236}">
+                <a16:creationId xmlns:a16="http://schemas.microsoft.com/office/drawing/2014/main" id="{CFD9399B-18C3-F74C-BEAC-D4FD6B5F28D7}"/>
+              </a:ext>
+            </a:extLst>
+          </p:cNvPr>
+          <p:cNvSpPr>
+            <a:spLocks noGrp="1"/>
+          </p:cNvSpPr>
+          <p:nvPr>
+            <p:ph idx="1"/>
+          </p:nvPr>
+        </p:nvSpPr>
+        <p:spPr>
+          <a:xfrm>
+            <a:off x="854858" y="1435842"/>
+            <a:ext cx="10515600" cy="4351338"/>
+          </a:xfrm>
+        </p:spPr>
+        <p:txBody>
+          <a:bodyPr/>
+          <a:lstStyle/>
+          <a:p>
+            <a:r>
+              <a:rPr lang="de-DE" dirty="0"/>
+              <a:t>Spring Boot</a:t>
+            </a:r>
+          </a:p>
+          <a:p>
+            <a:pPr marL="457200" lvl="1" indent="0">
+              <a:buNone/>
+            </a:pPr>
+            <a:r>
+              <a:rPr lang="de-DE" dirty="0"/>
+              <a:t>+ weniger </a:t>
+            </a:r>
+            <a:r>
+              <a:rPr lang="de-DE" dirty="0" err="1"/>
+              <a:t>Boilerplatecode</a:t>
+            </a:r>
+            <a:endParaRPr lang="de-DE" dirty="0"/>
+          </a:p>
+          <a:p>
+            <a:pPr marL="457200" lvl="1" indent="0">
+              <a:buNone/>
+            </a:pPr>
+            <a:r>
+              <a:rPr lang="de-DE" dirty="0"/>
+              <a:t>+ speichert persistent </a:t>
+            </a:r>
+          </a:p>
+          <a:p>
+            <a:pPr marL="457200" lvl="1" indent="0">
+              <a:buNone/>
+            </a:pPr>
+            <a:r>
+              <a:rPr lang="de-DE" dirty="0"/>
+              <a:t>+ übersichtlich</a:t>
+            </a:r>
+          </a:p>
+          <a:p>
+            <a:pPr marL="457200" lvl="1" indent="0">
+              <a:buNone/>
+            </a:pPr>
+            <a:endParaRPr lang="de-DE" dirty="0"/>
+          </a:p>
+          <a:p>
+            <a:r>
+              <a:rPr lang="de-DE" dirty="0"/>
+              <a:t>Interceptor zur Validierung</a:t>
+            </a:r>
+          </a:p>
+          <a:p>
+            <a:pPr marL="457200" lvl="1" indent="0">
+              <a:buNone/>
+            </a:pPr>
+            <a:r>
+              <a:rPr lang="de-DE" dirty="0"/>
+              <a:t>+ serverseitiges Interesse</a:t>
+            </a:r>
+          </a:p>
+          <a:p>
+            <a:pPr marL="457200" lvl="1" indent="0">
+              <a:buNone/>
+            </a:pPr>
+            <a:r>
+              <a:rPr lang="de-DE" dirty="0"/>
+              <a:t>+ selbstständige Validierung</a:t>
+            </a:r>
+          </a:p>
+          <a:p>
+            <a:pPr marL="457200" lvl="1" indent="0">
+              <a:buNone/>
+            </a:pPr>
+            <a:endParaRPr lang="de-DE" dirty="0"/>
+          </a:p>
+          <a:p>
+            <a:pPr marL="457200" lvl="1" indent="0">
+              <a:buNone/>
+            </a:pPr>
+            <a:endParaRPr lang="de-DE" dirty="0"/>
+          </a:p>
+          <a:p>
+            <a:endParaRPr lang="de-DE" dirty="0"/>
+          </a:p>
+        </p:txBody>
+      </p:sp>
     </p:spTree>
     <p:extLst>
       <p:ext uri="{BB962C8B-B14F-4D97-AF65-F5344CB8AC3E}">
@@ -17970,10 +18779,10 @@
         </p:nvGrpSpPr>
         <p:grpSpPr>
           <a:xfrm>
-            <a:off x="200491" y="1379479"/>
-            <a:ext cx="11937626" cy="3874696"/>
-            <a:chOff x="128303" y="1379478"/>
-            <a:chExt cx="12010122" cy="4327291"/>
+            <a:off x="200491" y="1131191"/>
+            <a:ext cx="11937627" cy="3923518"/>
+            <a:chOff x="128303" y="1159485"/>
+            <a:chExt cx="12010123" cy="4327291"/>
           </a:xfrm>
         </p:grpSpPr>
         <p:cxnSp>
@@ -18062,10 +18871,10 @@
           </p:nvGrpSpPr>
           <p:grpSpPr>
             <a:xfrm>
-              <a:off x="128303" y="1379478"/>
-              <a:ext cx="12010122" cy="4327291"/>
-              <a:chOff x="128303" y="1379478"/>
-              <a:chExt cx="12010122" cy="4327291"/>
+              <a:off x="128303" y="1159485"/>
+              <a:ext cx="12010123" cy="4327291"/>
+              <a:chOff x="128303" y="1159485"/>
+              <a:chExt cx="12010123" cy="4327291"/>
             </a:xfrm>
           </p:grpSpPr>
           <p:grpSp>
@@ -18082,10 +18891,10 @@
             </p:nvGrpSpPr>
             <p:grpSpPr>
               <a:xfrm>
-                <a:off x="128303" y="1379478"/>
-                <a:ext cx="12010122" cy="4327291"/>
-                <a:chOff x="128303" y="1379478"/>
-                <a:chExt cx="12010122" cy="4327291"/>
+                <a:off x="128303" y="1159485"/>
+                <a:ext cx="12010123" cy="4327291"/>
+                <a:chOff x="128303" y="1159485"/>
+                <a:chExt cx="12010123" cy="4327291"/>
               </a:xfrm>
             </p:grpSpPr>
             <p:sp>
@@ -18102,7 +18911,7 @@
               </p:nvSpPr>
               <p:spPr>
                 <a:xfrm>
-                  <a:off x="2454132" y="1379478"/>
+                  <a:off x="2454133" y="1159485"/>
                   <a:ext cx="9684293" cy="4327291"/>
                 </a:xfrm>
                 <a:prstGeom prst="rect">
@@ -18534,10 +19343,10 @@
               </p:nvGrpSpPr>
               <p:grpSpPr>
                 <a:xfrm>
-                  <a:off x="4656995" y="1871978"/>
-                  <a:ext cx="7303359" cy="1671145"/>
-                  <a:chOff x="4781070" y="3744310"/>
-                  <a:chExt cx="7303359" cy="1671145"/>
+                  <a:off x="4656995" y="1303257"/>
+                  <a:ext cx="7303359" cy="2239866"/>
+                  <a:chOff x="4781070" y="3175589"/>
+                  <a:chExt cx="7303359" cy="2239866"/>
                 </a:xfrm>
               </p:grpSpPr>
               <p:sp>
@@ -18554,8 +19363,8 @@
                 </p:nvSpPr>
                 <p:spPr>
                   <a:xfrm>
-                    <a:off x="4781070" y="3744310"/>
-                    <a:ext cx="7303359" cy="1671145"/>
+                    <a:off x="4781070" y="3175589"/>
+                    <a:ext cx="7303359" cy="2239866"/>
                   </a:xfrm>
                   <a:prstGeom prst="roundRect">
                     <a:avLst/>
@@ -18798,7 +19607,7 @@
                 </p:nvSpPr>
                 <p:spPr>
                   <a:xfrm>
-                    <a:off x="4983030" y="3858434"/>
+                    <a:off x="5008833" y="3208037"/>
                     <a:ext cx="1612199" cy="369332"/>
                   </a:xfrm>
                   <a:prstGeom prst="rect">
@@ -19197,6 +20006,96 @@
           </a:p>
         </p:txBody>
       </p:sp>
+      <p:sp>
+        <p:nvSpPr>
+          <p:cNvPr id="67" name="Abgerundetes Rechteck 66">
+            <a:extLst>
+              <a:ext uri="{FF2B5EF4-FFF2-40B4-BE49-F238E27FC236}">
+                <a16:creationId xmlns:a16="http://schemas.microsoft.com/office/drawing/2014/main" id="{B693A296-9D2F-8E40-A5A0-C4713D146172}"/>
+              </a:ext>
+            </a:extLst>
+          </p:cNvPr>
+          <p:cNvSpPr/>
+          <p:nvPr/>
+        </p:nvSpPr>
+        <p:spPr>
+          <a:xfrm>
+            <a:off x="5214450" y="1655258"/>
+            <a:ext cx="1339135" cy="564664"/>
+          </a:xfrm>
+          <a:prstGeom prst="roundRect">
+            <a:avLst/>
+          </a:prstGeom>
+        </p:spPr>
+        <p:style>
+          <a:lnRef idx="2">
+            <a:schemeClr val="accent1">
+              <a:shade val="50000"/>
+            </a:schemeClr>
+          </a:lnRef>
+          <a:fillRef idx="1">
+            <a:schemeClr val="accent1"/>
+          </a:fillRef>
+          <a:effectRef idx="0">
+            <a:schemeClr val="accent1"/>
+          </a:effectRef>
+          <a:fontRef idx="minor">
+            <a:schemeClr val="lt1"/>
+          </a:fontRef>
+        </p:style>
+        <p:txBody>
+          <a:bodyPr rtlCol="0" anchor="ctr"/>
+          <a:lstStyle/>
+          <a:p>
+            <a:pPr algn="ctr"/>
+            <a:r>
+              <a:rPr lang="de-DE" dirty="0"/>
+              <a:t>Validierung</a:t>
+            </a:r>
+          </a:p>
+        </p:txBody>
+      </p:sp>
+      <p:cxnSp>
+        <p:nvCxnSpPr>
+          <p:cNvPr id="7" name="Gewinkelte Verbindung 6">
+            <a:extLst>
+              <a:ext uri="{FF2B5EF4-FFF2-40B4-BE49-F238E27FC236}">
+                <a16:creationId xmlns:a16="http://schemas.microsoft.com/office/drawing/2014/main" id="{A273B2C7-73B5-BC42-B33D-B55E4086289D}"/>
+              </a:ext>
+            </a:extLst>
+          </p:cNvPr>
+          <p:cNvCxnSpPr>
+            <a:stCxn id="67" idx="1"/>
+          </p:cNvCxnSpPr>
+          <p:nvPr/>
+        </p:nvCxnSpPr>
+        <p:spPr>
+          <a:xfrm rot="10800000" flipV="1">
+            <a:off x="4902590" y="1937589"/>
+            <a:ext cx="311861" cy="640147"/>
+          </a:xfrm>
+          <a:prstGeom prst="bentConnector2">
+            <a:avLst/>
+          </a:prstGeom>
+          <a:ln>
+            <a:tailEnd type="triangle"/>
+          </a:ln>
+        </p:spPr>
+        <p:style>
+          <a:lnRef idx="1">
+            <a:schemeClr val="dk1"/>
+          </a:lnRef>
+          <a:fillRef idx="0">
+            <a:schemeClr val="dk1"/>
+          </a:fillRef>
+          <a:effectRef idx="0">
+            <a:schemeClr val="dk1"/>
+          </a:effectRef>
+          <a:fontRef idx="minor">
+            <a:schemeClr val="tx1"/>
+          </a:fontRef>
+        </p:style>
+      </p:cxnSp>
     </p:spTree>
     <p:extLst>
       <p:ext uri="{BB962C8B-B14F-4D97-AF65-F5344CB8AC3E}">

</xml_diff>

<commit_message>
Präsentation Retrofit -> REST
</commit_message>
<xml_diff>
--- a/Praesentationen/02-Entwurfsphase/Entwurf Präsentation.pptx
+++ b/Praesentationen/02-Entwurfsphase/Entwurf Präsentation.pptx
@@ -142,6 +142,7 @@
 <p1510:revInfo xmlns:a="http://schemas.openxmlformats.org/drawingml/2006/main" xmlns:r="http://schemas.openxmlformats.org/officeDocument/2006/relationships" xmlns:p1510="http://schemas.microsoft.com/office/powerpoint/2015/10/main">
   <p1510:revLst>
     <p1510:client id="{B121F1B0-4D08-E747-A677-49BC57413863}" v="43" dt="2022-01-09T14:35:28.470"/>
+    <p1510:client id="{C067BB00-D62D-434A-8EB6-2D39E9BF5514}" v="1" dt="2022-01-09T15:02:49.410"/>
   </p1510:revLst>
 </p1510:revInfo>
 </file>
@@ -151,10 +152,41 @@
   <pc:docChgLst>
     <pc:chgData name="Ender Merlin" userId="b6c700318fa50b6b" providerId="LiveId" clId="{C067BB00-D62D-434A-8EB6-2D39E9BF5514}"/>
     <pc:docChg chg="modSld">
-      <pc:chgData name="Ender Merlin" userId="b6c700318fa50b6b" providerId="LiveId" clId="{C067BB00-D62D-434A-8EB6-2D39E9BF5514}" dt="2022-01-07T20:52:54.641" v="0" actId="1076"/>
+      <pc:chgData name="Ender Merlin" userId="b6c700318fa50b6b" providerId="LiveId" clId="{C067BB00-D62D-434A-8EB6-2D39E9BF5514}" dt="2022-01-09T15:03:36.677" v="26" actId="1076"/>
       <pc:docMkLst>
         <pc:docMk/>
       </pc:docMkLst>
+      <pc:sldChg chg="addSp modSp mod">
+        <pc:chgData name="Ender Merlin" userId="b6c700318fa50b6b" providerId="LiveId" clId="{C067BB00-D62D-434A-8EB6-2D39E9BF5514}" dt="2022-01-09T15:03:36.677" v="26" actId="1076"/>
+        <pc:sldMkLst>
+          <pc:docMk/>
+          <pc:sldMk cId="3028429449" sldId="258"/>
+        </pc:sldMkLst>
+        <pc:spChg chg="add mod">
+          <ac:chgData name="Ender Merlin" userId="b6c700318fa50b6b" providerId="LiveId" clId="{C067BB00-D62D-434A-8EB6-2D39E9BF5514}" dt="2022-01-09T15:03:36.677" v="26" actId="1076"/>
+          <ac:spMkLst>
+            <pc:docMk/>
+            <pc:sldMk cId="3028429449" sldId="258"/>
+            <ac:spMk id="10" creationId="{8CE7D389-2EE7-45D5-868B-9FA8A6FBF66D}"/>
+          </ac:spMkLst>
+        </pc:spChg>
+        <pc:picChg chg="mod">
+          <ac:chgData name="Ender Merlin" userId="b6c700318fa50b6b" providerId="LiveId" clId="{C067BB00-D62D-434A-8EB6-2D39E9BF5514}" dt="2022-01-09T15:03:27.875" v="24" actId="1076"/>
+          <ac:picMkLst>
+            <pc:docMk/>
+            <pc:sldMk cId="3028429449" sldId="258"/>
+            <ac:picMk id="7" creationId="{D3CA1F16-E51A-4416-B464-C51358BE58E0}"/>
+          </ac:picMkLst>
+        </pc:picChg>
+        <pc:picChg chg="add mod">
+          <ac:chgData name="Ender Merlin" userId="b6c700318fa50b6b" providerId="LiveId" clId="{C067BB00-D62D-434A-8EB6-2D39E9BF5514}" dt="2022-01-09T15:02:09.705" v="4" actId="14100"/>
+          <ac:picMkLst>
+            <pc:docMk/>
+            <pc:sldMk cId="3028429449" sldId="258"/>
+            <ac:picMk id="8" creationId="{EF5A880B-C6A9-414B-8E81-0B6819CB8081}"/>
+          </ac:picMkLst>
+        </pc:picChg>
+      </pc:sldChg>
       <pc:sldChg chg="modSp mod">
         <pc:chgData name="Ender Merlin" userId="b6c700318fa50b6b" providerId="LiveId" clId="{C067BB00-D62D-434A-8EB6-2D39E9BF5514}" dt="2022-01-07T20:52:54.641" v="0" actId="1076"/>
         <pc:sldMkLst>
@@ -257,7 +289,7 @@
           <a:p>
             <a:fld id="{F899D2DC-6997-404A-B859-2EC79104A957}" type="datetimeFigureOut">
               <a:rPr lang="de-DE" smtClean="0"/>
-              <a:t>09.01.22</a:t>
+              <a:t>09.01.2022</a:t>
             </a:fld>
             <a:endParaRPr lang="de-DE"/>
           </a:p>
@@ -1525,7 +1557,7 @@
           <a:p>
             <a:fld id="{D4A7F7FB-B369-497A-97C2-098805D1A52E}" type="datetimeFigureOut">
               <a:rPr lang="de-DE" smtClean="0"/>
-              <a:t>09.01.22</a:t>
+              <a:t>09.01.2022</a:t>
             </a:fld>
             <a:endParaRPr lang="de-DE"/>
           </a:p>
@@ -1725,7 +1757,7 @@
           <a:p>
             <a:fld id="{D4A7F7FB-B369-497A-97C2-098805D1A52E}" type="datetimeFigureOut">
               <a:rPr lang="de-DE" smtClean="0"/>
-              <a:t>09.01.22</a:t>
+              <a:t>09.01.2022</a:t>
             </a:fld>
             <a:endParaRPr lang="de-DE"/>
           </a:p>
@@ -1935,7 +1967,7 @@
           <a:p>
             <a:fld id="{D4A7F7FB-B369-497A-97C2-098805D1A52E}" type="datetimeFigureOut">
               <a:rPr lang="de-DE" smtClean="0"/>
-              <a:t>09.01.22</a:t>
+              <a:t>09.01.2022</a:t>
             </a:fld>
             <a:endParaRPr lang="de-DE"/>
           </a:p>
@@ -2204,7 +2236,7 @@
           <a:p>
             <a:fld id="{D4A7F7FB-B369-497A-97C2-098805D1A52E}" type="datetimeFigureOut">
               <a:rPr lang="de-DE" smtClean="0"/>
-              <a:t>09.01.22</a:t>
+              <a:t>09.01.2022</a:t>
             </a:fld>
             <a:endParaRPr lang="de-DE"/>
           </a:p>
@@ -2374,7 +2406,7 @@
           <a:p>
             <a:fld id="{D4A7F7FB-B369-497A-97C2-098805D1A52E}" type="datetimeFigureOut">
               <a:rPr lang="de-DE" smtClean="0"/>
-              <a:t>09.01.22</a:t>
+              <a:t>09.01.2022</a:t>
             </a:fld>
             <a:endParaRPr lang="de-DE"/>
           </a:p>
@@ -2631,7 +2663,7 @@
           <a:p>
             <a:fld id="{D4A7F7FB-B369-497A-97C2-098805D1A52E}" type="datetimeFigureOut">
               <a:rPr lang="de-DE" smtClean="0"/>
-              <a:t>09.01.22</a:t>
+              <a:t>09.01.2022</a:t>
             </a:fld>
             <a:endParaRPr lang="de-DE"/>
           </a:p>
@@ -2863,7 +2895,7 @@
           <a:p>
             <a:fld id="{D4A7F7FB-B369-497A-97C2-098805D1A52E}" type="datetimeFigureOut">
               <a:rPr lang="de-DE" smtClean="0"/>
-              <a:t>09.01.22</a:t>
+              <a:t>09.01.2022</a:t>
             </a:fld>
             <a:endParaRPr lang="de-DE"/>
           </a:p>
@@ -3256,7 +3288,7 @@
           <a:p>
             <a:fld id="{D4A7F7FB-B369-497A-97C2-098805D1A52E}" type="datetimeFigureOut">
               <a:rPr lang="de-DE" smtClean="0"/>
-              <a:t>09.01.22</a:t>
+              <a:t>09.01.2022</a:t>
             </a:fld>
             <a:endParaRPr lang="de-DE"/>
           </a:p>
@@ -3374,7 +3406,7 @@
           <a:p>
             <a:fld id="{D4A7F7FB-B369-497A-97C2-098805D1A52E}" type="datetimeFigureOut">
               <a:rPr lang="de-DE" smtClean="0"/>
-              <a:t>09.01.22</a:t>
+              <a:t>09.01.2022</a:t>
             </a:fld>
             <a:endParaRPr lang="de-DE"/>
           </a:p>
@@ -3469,7 +3501,7 @@
           <a:p>
             <a:fld id="{D4A7F7FB-B369-497A-97C2-098805D1A52E}" type="datetimeFigureOut">
               <a:rPr lang="de-DE" smtClean="0"/>
-              <a:t>09.01.22</a:t>
+              <a:t>09.01.2022</a:t>
             </a:fld>
             <a:endParaRPr lang="de-DE"/>
           </a:p>
@@ -3742,7 +3774,7 @@
           <a:p>
             <a:fld id="{D4A7F7FB-B369-497A-97C2-098805D1A52E}" type="datetimeFigureOut">
               <a:rPr lang="de-DE" smtClean="0"/>
-              <a:t>09.01.22</a:t>
+              <a:t>09.01.2022</a:t>
             </a:fld>
             <a:endParaRPr lang="de-DE"/>
           </a:p>
@@ -3930,7 +3962,7 @@
           <a:p>
             <a:fld id="{D4A7F7FB-B369-497A-97C2-098805D1A52E}" type="datetimeFigureOut">
               <a:rPr lang="de-DE" smtClean="0"/>
-              <a:t>09.01.22</a:t>
+              <a:t>09.01.2022</a:t>
             </a:fld>
             <a:endParaRPr lang="de-DE"/>
           </a:p>
@@ -4223,7 +4255,7 @@
           <a:p>
             <a:fld id="{D4A7F7FB-B369-497A-97C2-098805D1A52E}" type="datetimeFigureOut">
               <a:rPr lang="de-DE" smtClean="0"/>
-              <a:t>09.01.22</a:t>
+              <a:t>09.01.2022</a:t>
             </a:fld>
             <a:endParaRPr lang="de-DE"/>
           </a:p>
@@ -4504,7 +4536,7 @@
           <a:p>
             <a:fld id="{D4A7F7FB-B369-497A-97C2-098805D1A52E}" type="datetimeFigureOut">
               <a:rPr lang="de-DE" smtClean="0"/>
-              <a:t>09.01.22</a:t>
+              <a:t>09.01.2022</a:t>
             </a:fld>
             <a:endParaRPr lang="de-DE"/>
           </a:p>
@@ -4696,7 +4728,7 @@
           <a:p>
             <a:fld id="{D4A7F7FB-B369-497A-97C2-098805D1A52E}" type="datetimeFigureOut">
               <a:rPr lang="de-DE" smtClean="0"/>
-              <a:t>09.01.22</a:t>
+              <a:t>09.01.2022</a:t>
             </a:fld>
             <a:endParaRPr lang="de-DE"/>
           </a:p>
@@ -4957,7 +4989,7 @@
           <a:p>
             <a:fld id="{D4A7F7FB-B369-497A-97C2-098805D1A52E}" type="datetimeFigureOut">
               <a:rPr lang="de-DE" smtClean="0"/>
-              <a:t>09.01.22</a:t>
+              <a:t>09.01.2022</a:t>
             </a:fld>
             <a:endParaRPr lang="de-DE"/>
           </a:p>
@@ -5383,7 +5415,7 @@
           <a:p>
             <a:fld id="{D4A7F7FB-B369-497A-97C2-098805D1A52E}" type="datetimeFigureOut">
               <a:rPr lang="de-DE" smtClean="0"/>
-              <a:t>09.01.22</a:t>
+              <a:t>09.01.2022</a:t>
             </a:fld>
             <a:endParaRPr lang="de-DE"/>
           </a:p>
@@ -5929,7 +5961,7 @@
           <a:p>
             <a:fld id="{D4A7F7FB-B369-497A-97C2-098805D1A52E}" type="datetimeFigureOut">
               <a:rPr lang="de-DE" smtClean="0"/>
-              <a:t>09.01.22</a:t>
+              <a:t>09.01.2022</a:t>
             </a:fld>
             <a:endParaRPr lang="de-DE"/>
           </a:p>
@@ -6760,7 +6792,7 @@
           <a:p>
             <a:fld id="{D4A7F7FB-B369-497A-97C2-098805D1A52E}" type="datetimeFigureOut">
               <a:rPr lang="de-DE" smtClean="0"/>
-              <a:t>09.01.22</a:t>
+              <a:t>09.01.2022</a:t>
             </a:fld>
             <a:endParaRPr lang="de-DE"/>
           </a:p>
@@ -6930,7 +6962,7 @@
           <a:p>
             <a:fld id="{D4A7F7FB-B369-497A-97C2-098805D1A52E}" type="datetimeFigureOut">
               <a:rPr lang="de-DE" smtClean="0"/>
-              <a:t>09.01.22</a:t>
+              <a:t>09.01.2022</a:t>
             </a:fld>
             <a:endParaRPr lang="de-DE"/>
           </a:p>
@@ -7110,7 +7142,7 @@
           <a:p>
             <a:fld id="{D4A7F7FB-B369-497A-97C2-098805D1A52E}" type="datetimeFigureOut">
               <a:rPr lang="de-DE" smtClean="0"/>
-              <a:t>09.01.22</a:t>
+              <a:t>09.01.2022</a:t>
             </a:fld>
             <a:endParaRPr lang="de-DE"/>
           </a:p>
@@ -7374,7 +7406,7 @@
           <a:p>
             <a:fld id="{D4A7F7FB-B369-497A-97C2-098805D1A52E}" type="datetimeFigureOut">
               <a:rPr lang="de-DE" smtClean="0"/>
-              <a:t>09.01.22</a:t>
+              <a:t>09.01.2022</a:t>
             </a:fld>
             <a:endParaRPr lang="de-DE"/>
           </a:p>
@@ -7642,7 +7674,7 @@
           <a:p>
             <a:fld id="{D4A7F7FB-B369-497A-97C2-098805D1A52E}" type="datetimeFigureOut">
               <a:rPr lang="de-DE" smtClean="0"/>
-              <a:t>09.01.22</a:t>
+              <a:t>09.01.2022</a:t>
             </a:fld>
             <a:endParaRPr lang="de-DE"/>
           </a:p>
@@ -8057,7 +8089,7 @@
           <a:p>
             <a:fld id="{D4A7F7FB-B369-497A-97C2-098805D1A52E}" type="datetimeFigureOut">
               <a:rPr lang="de-DE" smtClean="0"/>
-              <a:t>09.01.22</a:t>
+              <a:t>09.01.2022</a:t>
             </a:fld>
             <a:endParaRPr lang="de-DE"/>
           </a:p>
@@ -8199,7 +8231,7 @@
           <a:p>
             <a:fld id="{D4A7F7FB-B369-497A-97C2-098805D1A52E}" type="datetimeFigureOut">
               <a:rPr lang="de-DE" smtClean="0"/>
-              <a:t>09.01.22</a:t>
+              <a:t>09.01.2022</a:t>
             </a:fld>
             <a:endParaRPr lang="de-DE"/>
           </a:p>
@@ -8312,7 +8344,7 @@
           <a:p>
             <a:fld id="{D4A7F7FB-B369-497A-97C2-098805D1A52E}" type="datetimeFigureOut">
               <a:rPr lang="de-DE" smtClean="0"/>
-              <a:t>09.01.22</a:t>
+              <a:t>09.01.2022</a:t>
             </a:fld>
             <a:endParaRPr lang="de-DE"/>
           </a:p>
@@ -8625,7 +8657,7 @@
           <a:p>
             <a:fld id="{D4A7F7FB-B369-497A-97C2-098805D1A52E}" type="datetimeFigureOut">
               <a:rPr lang="de-DE" smtClean="0"/>
-              <a:t>09.01.22</a:t>
+              <a:t>09.01.2022</a:t>
             </a:fld>
             <a:endParaRPr lang="de-DE"/>
           </a:p>
@@ -8914,7 +8946,7 @@
           <a:p>
             <a:fld id="{D4A7F7FB-B369-497A-97C2-098805D1A52E}" type="datetimeFigureOut">
               <a:rPr lang="de-DE" smtClean="0"/>
-              <a:t>09.01.22</a:t>
+              <a:t>09.01.2022</a:t>
             </a:fld>
             <a:endParaRPr lang="de-DE"/>
           </a:p>
@@ -9157,7 +9189,7 @@
           <a:p>
             <a:fld id="{D4A7F7FB-B369-497A-97C2-098805D1A52E}" type="datetimeFigureOut">
               <a:rPr lang="de-DE" smtClean="0"/>
-              <a:t>09.01.22</a:t>
+              <a:t>09.01.2022</a:t>
             </a:fld>
             <a:endParaRPr lang="de-DE"/>
           </a:p>
@@ -9736,7 +9768,7 @@
           <a:p>
             <a:fld id="{D4A7F7FB-B369-497A-97C2-098805D1A52E}" type="datetimeFigureOut">
               <a:rPr lang="de-DE" smtClean="0"/>
-              <a:t>09.01.22</a:t>
+              <a:t>09.01.2022</a:t>
             </a:fld>
             <a:endParaRPr lang="de-DE"/>
           </a:p>
@@ -15831,7 +15863,7 @@
         </p:blipFill>
         <p:spPr>
           <a:xfrm>
-            <a:off x="5077193" y="823156"/>
+            <a:off x="5077193" y="825537"/>
             <a:ext cx="6723669" cy="5042752"/>
           </a:xfrm>
           <a:prstGeom prst="rect">
@@ -15912,6 +15944,72 @@
               <a:buFontTx/>
               <a:buChar char="-"/>
             </a:pPr>
+            <a:endParaRPr lang="de-DE" dirty="0"/>
+          </a:p>
+        </p:txBody>
+      </p:sp>
+      <p:pic>
+        <p:nvPicPr>
+          <p:cNvPr id="8" name="Grafik 7">
+            <a:extLst>
+              <a:ext uri="{FF2B5EF4-FFF2-40B4-BE49-F238E27FC236}">
+                <a16:creationId xmlns:a16="http://schemas.microsoft.com/office/drawing/2014/main" id="{EF5A880B-C6A9-414B-8E81-0B6819CB8081}"/>
+              </a:ext>
+            </a:extLst>
+          </p:cNvPr>
+          <p:cNvPicPr>
+            <a:picLocks noChangeAspect="1"/>
+          </p:cNvPicPr>
+          <p:nvPr/>
+        </p:nvPicPr>
+        <p:blipFill>
+          <a:blip r:embed="rId3"/>
+          <a:stretch>
+            <a:fillRect/>
+          </a:stretch>
+        </p:blipFill>
+        <p:spPr>
+          <a:xfrm>
+            <a:off x="9985995" y="4496738"/>
+            <a:ext cx="481980" cy="200053"/>
+          </a:xfrm>
+          <a:prstGeom prst="rect">
+            <a:avLst/>
+          </a:prstGeom>
+        </p:spPr>
+      </p:pic>
+      <p:sp>
+        <p:nvSpPr>
+          <p:cNvPr id="10" name="Textfeld 9">
+            <a:extLst>
+              <a:ext uri="{FF2B5EF4-FFF2-40B4-BE49-F238E27FC236}">
+                <a16:creationId xmlns:a16="http://schemas.microsoft.com/office/drawing/2014/main" id="{8CE7D389-2EE7-45D5-868B-9FA8A6FBF66D}"/>
+              </a:ext>
+            </a:extLst>
+          </p:cNvPr>
+          <p:cNvSpPr txBox="1"/>
+          <p:nvPr/>
+        </p:nvSpPr>
+        <p:spPr>
+          <a:xfrm>
+            <a:off x="10007426" y="4473653"/>
+            <a:ext cx="439118" cy="246221"/>
+          </a:xfrm>
+          <a:prstGeom prst="rect">
+            <a:avLst/>
+          </a:prstGeom>
+          <a:noFill/>
+        </p:spPr>
+        <p:txBody>
+          <a:bodyPr wrap="square" rtlCol="0">
+            <a:spAutoFit/>
+          </a:bodyPr>
+          <a:lstStyle/>
+          <a:p>
+            <a:r>
+              <a:rPr lang="de-DE" sz="1000" dirty="0"/>
+              <a:t>REST</a:t>
+            </a:r>
             <a:endParaRPr lang="de-DE" dirty="0"/>
           </a:p>
         </p:txBody>

</xml_diff>